<commit_message>
tuffle install and config
</commit_message>
<xml_diff>
--- a/Blockchain-notes.pptx
+++ b/Blockchain-notes.pptx
@@ -8,6 +8,12 @@
     <p:sldId id="268" r:id="rId5"/>
     <p:sldId id="310" r:id="rId6"/>
     <p:sldId id="311" r:id="rId7"/>
+    <p:sldId id="317" r:id="rId8"/>
+    <p:sldId id="312" r:id="rId9"/>
+    <p:sldId id="313" r:id="rId10"/>
+    <p:sldId id="314" r:id="rId11"/>
+    <p:sldId id="315" r:id="rId12"/>
+    <p:sldId id="316" r:id="rId13"/>
   </p:sldIdLst>
   <p:sldSz cx="12192000" cy="6858000"/>
   <p:notesSz cx="6858000" cy="9144000"/>
@@ -3699,7 +3705,7 @@
                   <a:schemeClr val="accent1"/>
                 </a:solidFill>
               </a:rPr>
-              <a:t>Solidity and Ethereum with React/Next – Udemy course</a:t>
+              <a:t>Solidity and Ethereum with React/Next.JS – Udemy course</a:t>
             </a:r>
           </a:p>
         </p:txBody>
@@ -3801,7 +3807,10 @@
           <a:bodyPr/>
           <a:lstStyle/>
           <a:p>
-            <a:endParaRPr lang="en-US"/>
+            <a:r>
+              <a:rPr lang="en-US" dirty="0"/>
+              <a:t>Terms</a:t>
+            </a:r>
           </a:p>
         </p:txBody>
       </p:sp>
@@ -3826,7 +3835,57 @@
           <a:bodyPr/>
           <a:lstStyle/>
           <a:p>
-            <a:endParaRPr lang="en-US"/>
+            <a:r>
+              <a:rPr lang="en-US" dirty="0"/>
+              <a:t>Blockchain	Mining/Minors	Ethereum Remix	Truffle</a:t>
+            </a:r>
+          </a:p>
+          <a:p>
+            <a:r>
+              <a:rPr lang="en-US" dirty="0"/>
+              <a:t>Bitcoin		transactions	Dapps	Ganache</a:t>
+            </a:r>
+          </a:p>
+          <a:p>
+            <a:r>
+              <a:rPr lang="en-US" dirty="0"/>
+              <a:t>Cryptography	Decentralized</a:t>
+            </a:r>
+          </a:p>
+          <a:p>
+            <a:r>
+              <a:rPr lang="en-US" dirty="0"/>
+              <a:t>Ethereum	networks	Wallet</a:t>
+            </a:r>
+          </a:p>
+          <a:p>
+            <a:r>
+              <a:rPr lang="en-US" dirty="0"/>
+              <a:t>Ether		hashcode	Bytecode</a:t>
+            </a:r>
+          </a:p>
+          <a:p>
+            <a:r>
+              <a:rPr lang="en-US" dirty="0"/>
+              <a:t>Node		</a:t>
+            </a:r>
+            <a:r>
+              <a:rPr lang="en-US" dirty="0" err="1"/>
+              <a:t>Trufflesuite</a:t>
+            </a:r>
+            <a:endParaRPr lang="en-US" dirty="0"/>
+          </a:p>
+          <a:p>
+            <a:r>
+              <a:rPr lang="en-US" dirty="0"/>
+              <a:t>Smart Contract	Ethereum Remix</a:t>
+            </a:r>
+          </a:p>
+          <a:p>
+            <a:endParaRPr lang="en-US" dirty="0"/>
+          </a:p>
+          <a:p>
+            <a:endParaRPr lang="en-US" dirty="0"/>
           </a:p>
         </p:txBody>
       </p:sp>
@@ -3834,6 +3893,663 @@
     <p:extLst>
       <p:ext uri="{BB962C8B-B14F-4D97-AF65-F5344CB8AC3E}">
         <p14:creationId xmlns:p14="http://schemas.microsoft.com/office/powerpoint/2010/main" val="3946151453"/>
+      </p:ext>
+    </p:extLst>
+  </p:cSld>
+  <p:clrMapOvr>
+    <a:masterClrMapping/>
+  </p:clrMapOvr>
+</p:sld>
+</file>
+
+<file path=ppt/slides/slide4.xml><?xml version="1.0" encoding="utf-8"?>
+<p:sld xmlns:a="http://schemas.openxmlformats.org/drawingml/2006/main" xmlns:r="http://schemas.openxmlformats.org/officeDocument/2006/relationships" xmlns:p="http://schemas.openxmlformats.org/presentationml/2006/main">
+  <p:cSld>
+    <p:spTree>
+      <p:nvGrpSpPr>
+        <p:cNvPr id="1" name=""/>
+        <p:cNvGrpSpPr/>
+        <p:nvPr/>
+      </p:nvGrpSpPr>
+      <p:grpSpPr>
+        <a:xfrm>
+          <a:off x="0" y="0"/>
+          <a:ext cx="0" cy="0"/>
+          <a:chOff x="0" y="0"/>
+          <a:chExt cx="0" cy="0"/>
+        </a:xfrm>
+      </p:grpSpPr>
+      <p:sp>
+        <p:nvSpPr>
+          <p:cNvPr id="2" name="Title 1">
+            <a:extLst>
+              <a:ext uri="{FF2B5EF4-FFF2-40B4-BE49-F238E27FC236}">
+                <a16:creationId xmlns:a16="http://schemas.microsoft.com/office/drawing/2014/main" id="{AA939FBD-B0D2-1429-799C-DD1B877909E6}"/>
+              </a:ext>
+            </a:extLst>
+          </p:cNvPr>
+          <p:cNvSpPr>
+            <a:spLocks noGrp="1"/>
+          </p:cNvSpPr>
+          <p:nvPr>
+            <p:ph type="title"/>
+          </p:nvPr>
+        </p:nvSpPr>
+        <p:spPr/>
+        <p:txBody>
+          <a:bodyPr/>
+          <a:lstStyle/>
+          <a:p>
+            <a:r>
+              <a:rPr lang="en-US" dirty="0"/>
+              <a:t>Commands used</a:t>
+            </a:r>
+          </a:p>
+        </p:txBody>
+      </p:sp>
+      <p:sp>
+        <p:nvSpPr>
+          <p:cNvPr id="3" name="Content Placeholder 2">
+            <a:extLst>
+              <a:ext uri="{FF2B5EF4-FFF2-40B4-BE49-F238E27FC236}">
+                <a16:creationId xmlns:a16="http://schemas.microsoft.com/office/drawing/2014/main" id="{FFA5C67F-B0BE-42F2-6CBC-E18F263C5A87}"/>
+              </a:ext>
+            </a:extLst>
+          </p:cNvPr>
+          <p:cNvSpPr>
+            <a:spLocks noGrp="1"/>
+          </p:cNvSpPr>
+          <p:nvPr>
+            <p:ph idx="1"/>
+          </p:nvPr>
+        </p:nvSpPr>
+        <p:spPr/>
+        <p:txBody>
+          <a:bodyPr/>
+          <a:lstStyle/>
+          <a:p>
+            <a:r>
+              <a:rPr lang="en-US" sz="800" dirty="0"/>
+              <a:t>1. Create a react app:</a:t>
+            </a:r>
+          </a:p>
+          <a:p>
+            <a:r>
+              <a:rPr lang="en-US" sz="800" dirty="0" err="1"/>
+              <a:t>npx</a:t>
+            </a:r>
+            <a:r>
+              <a:rPr lang="en-US" sz="800" dirty="0"/>
+              <a:t> create-react-app my-app</a:t>
+            </a:r>
+            <a:br>
+              <a:rPr lang="en-US" sz="800" dirty="0"/>
+            </a:br>
+            <a:r>
+              <a:rPr lang="en-US" sz="800" dirty="0"/>
+              <a:t>cd my-app</a:t>
+            </a:r>
+            <a:br>
+              <a:rPr lang="en-US" sz="800" dirty="0"/>
+            </a:br>
+            <a:r>
+              <a:rPr lang="en-US" sz="800" dirty="0" err="1"/>
+              <a:t>npm</a:t>
+            </a:r>
+            <a:r>
+              <a:rPr lang="en-US" sz="800" dirty="0"/>
+              <a:t> start</a:t>
+            </a:r>
+          </a:p>
+          <a:p>
+            <a:r>
+              <a:rPr lang="en-US" sz="800" dirty="0"/>
+              <a:t>2. Install truffle globally:</a:t>
+            </a:r>
+          </a:p>
+          <a:p>
+            <a:r>
+              <a:rPr lang="en-US" sz="800" dirty="0" err="1"/>
+              <a:t>npm</a:t>
+            </a:r>
+            <a:r>
+              <a:rPr lang="en-US" sz="800" dirty="0"/>
+              <a:t> install truffle –g</a:t>
+            </a:r>
+          </a:p>
+          <a:p>
+            <a:r>
+              <a:rPr lang="en-US" sz="800" dirty="0"/>
+              <a:t>Inside a react app:</a:t>
+            </a:r>
+          </a:p>
+          <a:p>
+            <a:r>
+              <a:rPr lang="en-US" sz="800" dirty="0"/>
+              <a:t>truffle </a:t>
+            </a:r>
+            <a:r>
+              <a:rPr lang="en-US" sz="800" dirty="0" err="1"/>
+              <a:t>init</a:t>
+            </a:r>
+            <a:endParaRPr lang="en-US" sz="800" dirty="0"/>
+          </a:p>
+          <a:p>
+            <a:r>
+              <a:rPr lang="en-US" dirty="0"/>
+              <a:t>truffle migrate</a:t>
+            </a:r>
+          </a:p>
+        </p:txBody>
+      </p:sp>
+    </p:spTree>
+    <p:extLst>
+      <p:ext uri="{BB962C8B-B14F-4D97-AF65-F5344CB8AC3E}">
+        <p14:creationId xmlns:p14="http://schemas.microsoft.com/office/powerpoint/2010/main" val="2882516316"/>
+      </p:ext>
+    </p:extLst>
+  </p:cSld>
+  <p:clrMapOvr>
+    <a:masterClrMapping/>
+  </p:clrMapOvr>
+</p:sld>
+</file>
+
+<file path=ppt/slides/slide5.xml><?xml version="1.0" encoding="utf-8"?>
+<p:sld xmlns:a="http://schemas.openxmlformats.org/drawingml/2006/main" xmlns:r="http://schemas.openxmlformats.org/officeDocument/2006/relationships" xmlns:p="http://schemas.openxmlformats.org/presentationml/2006/main">
+  <p:cSld>
+    <p:spTree>
+      <p:nvGrpSpPr>
+        <p:cNvPr id="1" name=""/>
+        <p:cNvGrpSpPr/>
+        <p:nvPr/>
+      </p:nvGrpSpPr>
+      <p:grpSpPr>
+        <a:xfrm>
+          <a:off x="0" y="0"/>
+          <a:ext cx="0" cy="0"/>
+          <a:chOff x="0" y="0"/>
+          <a:chExt cx="0" cy="0"/>
+        </a:xfrm>
+      </p:grpSpPr>
+      <p:sp>
+        <p:nvSpPr>
+          <p:cNvPr id="2" name="Title 1">
+            <a:extLst>
+              <a:ext uri="{FF2B5EF4-FFF2-40B4-BE49-F238E27FC236}">
+                <a16:creationId xmlns:a16="http://schemas.microsoft.com/office/drawing/2014/main" id="{7715E942-9432-4D8B-8F8A-C2510C387837}"/>
+              </a:ext>
+            </a:extLst>
+          </p:cNvPr>
+          <p:cNvSpPr>
+            <a:spLocks noGrp="1"/>
+          </p:cNvSpPr>
+          <p:nvPr>
+            <p:ph type="title"/>
+          </p:nvPr>
+        </p:nvSpPr>
+        <p:spPr/>
+        <p:txBody>
+          <a:bodyPr/>
+          <a:lstStyle/>
+          <a:p>
+            <a:r>
+              <a:rPr lang="en-US" dirty="0"/>
+              <a:t>What is blockchain?</a:t>
+            </a:r>
+          </a:p>
+        </p:txBody>
+      </p:sp>
+      <p:sp>
+        <p:nvSpPr>
+          <p:cNvPr id="3" name="Content Placeholder 2">
+            <a:extLst>
+              <a:ext uri="{FF2B5EF4-FFF2-40B4-BE49-F238E27FC236}">
+                <a16:creationId xmlns:a16="http://schemas.microsoft.com/office/drawing/2014/main" id="{55707283-F162-F6DD-7869-721077E77319}"/>
+              </a:ext>
+            </a:extLst>
+          </p:cNvPr>
+          <p:cNvSpPr>
+            <a:spLocks noGrp="1"/>
+          </p:cNvSpPr>
+          <p:nvPr>
+            <p:ph idx="1"/>
+          </p:nvPr>
+        </p:nvSpPr>
+        <p:spPr/>
+        <p:txBody>
+          <a:bodyPr/>
+          <a:lstStyle/>
+          <a:p>
+            <a:r>
+              <a:rPr lang="en-US" dirty="0"/>
+              <a:t>Simple Definition: Blockchain is simply a system or platform in which computers are connected to each other. They are following specific rules.</a:t>
+            </a:r>
+          </a:p>
+          <a:p>
+            <a:r>
+              <a:rPr lang="en-US" dirty="0"/>
+              <a:t>Wiki Definition: A Blockchain is a distributed ledger with growing lists of records (blocks) that are securely linked together via cryptographic hashes.</a:t>
+            </a:r>
+          </a:p>
+          <a:p>
+            <a:endParaRPr lang="en-US" dirty="0"/>
+          </a:p>
+        </p:txBody>
+      </p:sp>
+    </p:spTree>
+    <p:extLst>
+      <p:ext uri="{BB962C8B-B14F-4D97-AF65-F5344CB8AC3E}">
+        <p14:creationId xmlns:p14="http://schemas.microsoft.com/office/powerpoint/2010/main" val="2368901530"/>
+      </p:ext>
+    </p:extLst>
+  </p:cSld>
+  <p:clrMapOvr>
+    <a:masterClrMapping/>
+  </p:clrMapOvr>
+</p:sld>
+</file>
+
+<file path=ppt/slides/slide6.xml><?xml version="1.0" encoding="utf-8"?>
+<p:sld xmlns:a="http://schemas.openxmlformats.org/drawingml/2006/main" xmlns:r="http://schemas.openxmlformats.org/officeDocument/2006/relationships" xmlns:p="http://schemas.openxmlformats.org/presentationml/2006/main">
+  <p:cSld>
+    <p:spTree>
+      <p:nvGrpSpPr>
+        <p:cNvPr id="1" name=""/>
+        <p:cNvGrpSpPr/>
+        <p:nvPr/>
+      </p:nvGrpSpPr>
+      <p:grpSpPr>
+        <a:xfrm>
+          <a:off x="0" y="0"/>
+          <a:ext cx="0" cy="0"/>
+          <a:chOff x="0" y="0"/>
+          <a:chExt cx="0" cy="0"/>
+        </a:xfrm>
+      </p:grpSpPr>
+      <p:sp>
+        <p:nvSpPr>
+          <p:cNvPr id="2" name="Title 1">
+            <a:extLst>
+              <a:ext uri="{FF2B5EF4-FFF2-40B4-BE49-F238E27FC236}">
+                <a16:creationId xmlns:a16="http://schemas.microsoft.com/office/drawing/2014/main" id="{CA077B3A-C6D4-D068-DDF2-214BF2F69E59}"/>
+              </a:ext>
+            </a:extLst>
+          </p:cNvPr>
+          <p:cNvSpPr>
+            <a:spLocks noGrp="1"/>
+          </p:cNvSpPr>
+          <p:nvPr>
+            <p:ph type="title"/>
+          </p:nvPr>
+        </p:nvSpPr>
+        <p:spPr/>
+        <p:txBody>
+          <a:bodyPr/>
+          <a:lstStyle/>
+          <a:p>
+            <a:r>
+              <a:rPr lang="en-US" dirty="0"/>
+              <a:t>What is Ethereum Blockchain?</a:t>
+            </a:r>
+          </a:p>
+        </p:txBody>
+      </p:sp>
+      <p:sp>
+        <p:nvSpPr>
+          <p:cNvPr id="3" name="Content Placeholder 2">
+            <a:extLst>
+              <a:ext uri="{FF2B5EF4-FFF2-40B4-BE49-F238E27FC236}">
+                <a16:creationId xmlns:a16="http://schemas.microsoft.com/office/drawing/2014/main" id="{5F52E8C0-9F42-DFFB-E3DC-140C39E2D0B6}"/>
+              </a:ext>
+            </a:extLst>
+          </p:cNvPr>
+          <p:cNvSpPr>
+            <a:spLocks noGrp="1"/>
+          </p:cNvSpPr>
+          <p:nvPr>
+            <p:ph idx="1"/>
+          </p:nvPr>
+        </p:nvSpPr>
+        <p:spPr/>
+        <p:txBody>
+          <a:bodyPr/>
+          <a:lstStyle/>
+          <a:p>
+            <a:r>
+              <a:rPr lang="en-US" dirty="0"/>
+              <a:t>Ethereum blockchain has a digital currency called ether. Ethereum is open-source blockchain code network.</a:t>
+            </a:r>
+          </a:p>
+          <a:p>
+            <a:r>
+              <a:rPr lang="en-US" dirty="0"/>
+              <a:t>A decentralized system consisting of peers(nodes) running software that agrees on the protocol.</a:t>
+            </a:r>
+          </a:p>
+          <a:p>
+            <a:r>
+              <a:rPr lang="en-US" dirty="0"/>
+              <a:t>The result of such a system is the safe processing of transactions (currency transfers, code executions, </a:t>
+            </a:r>
+            <a:r>
+              <a:rPr lang="en-US" dirty="0" err="1"/>
+              <a:t>etc</a:t>
+            </a:r>
+            <a:r>
+              <a:rPr lang="en-US" dirty="0"/>
+              <a:t>). It has a single and one true state that can be verified at any given time.</a:t>
+            </a:r>
+          </a:p>
+          <a:p>
+            <a:r>
+              <a:rPr lang="en-US" dirty="0"/>
+              <a:t>Decentralized Network</a:t>
+            </a:r>
+          </a:p>
+          <a:p>
+            <a:r>
+              <a:rPr lang="en-US" dirty="0"/>
+              <a:t>Ethereum state: have all the transaction states</a:t>
+            </a:r>
+          </a:p>
+        </p:txBody>
+      </p:sp>
+    </p:spTree>
+    <p:extLst>
+      <p:ext uri="{BB962C8B-B14F-4D97-AF65-F5344CB8AC3E}">
+        <p14:creationId xmlns:p14="http://schemas.microsoft.com/office/powerpoint/2010/main" val="1399551879"/>
+      </p:ext>
+    </p:extLst>
+  </p:cSld>
+  <p:clrMapOvr>
+    <a:masterClrMapping/>
+  </p:clrMapOvr>
+</p:sld>
+</file>
+
+<file path=ppt/slides/slide7.xml><?xml version="1.0" encoding="utf-8"?>
+<p:sld xmlns:a="http://schemas.openxmlformats.org/drawingml/2006/main" xmlns:r="http://schemas.openxmlformats.org/officeDocument/2006/relationships" xmlns:p="http://schemas.openxmlformats.org/presentationml/2006/main">
+  <p:cSld>
+    <p:spTree>
+      <p:nvGrpSpPr>
+        <p:cNvPr id="1" name=""/>
+        <p:cNvGrpSpPr/>
+        <p:nvPr/>
+      </p:nvGrpSpPr>
+      <p:grpSpPr>
+        <a:xfrm>
+          <a:off x="0" y="0"/>
+          <a:ext cx="0" cy="0"/>
+          <a:chOff x="0" y="0"/>
+          <a:chExt cx="0" cy="0"/>
+        </a:xfrm>
+      </p:grpSpPr>
+      <p:sp>
+        <p:nvSpPr>
+          <p:cNvPr id="2" name="Title 1">
+            <a:extLst>
+              <a:ext uri="{FF2B5EF4-FFF2-40B4-BE49-F238E27FC236}">
+                <a16:creationId xmlns:a16="http://schemas.microsoft.com/office/drawing/2014/main" id="{D33A8F93-CA82-BCB5-1D25-D9D42E035275}"/>
+              </a:ext>
+            </a:extLst>
+          </p:cNvPr>
+          <p:cNvSpPr>
+            <a:spLocks noGrp="1"/>
+          </p:cNvSpPr>
+          <p:nvPr>
+            <p:ph type="title"/>
+          </p:nvPr>
+        </p:nvSpPr>
+        <p:spPr/>
+        <p:txBody>
+          <a:bodyPr/>
+          <a:lstStyle/>
+          <a:p>
+            <a:r>
+              <a:rPr lang="en-US" dirty="0"/>
+              <a:t>Solidity</a:t>
+            </a:r>
+          </a:p>
+        </p:txBody>
+      </p:sp>
+      <p:sp>
+        <p:nvSpPr>
+          <p:cNvPr id="3" name="Content Placeholder 2">
+            <a:extLst>
+              <a:ext uri="{FF2B5EF4-FFF2-40B4-BE49-F238E27FC236}">
+                <a16:creationId xmlns:a16="http://schemas.microsoft.com/office/drawing/2014/main" id="{4A7D31BD-0669-8C18-6D44-025FA29ADD97}"/>
+              </a:ext>
+            </a:extLst>
+          </p:cNvPr>
+          <p:cNvSpPr>
+            <a:spLocks noGrp="1"/>
+          </p:cNvSpPr>
+          <p:nvPr>
+            <p:ph idx="1"/>
+          </p:nvPr>
+        </p:nvSpPr>
+        <p:spPr/>
+        <p:txBody>
+          <a:bodyPr/>
+          <a:lstStyle/>
+          <a:p>
+            <a:r>
+              <a:rPr lang="en-US" dirty="0"/>
+              <a:t>Solidity is a programming language that supports all the OOP features.</a:t>
+            </a:r>
+          </a:p>
+          <a:p>
+            <a:r>
+              <a:rPr lang="en-US" dirty="0"/>
+              <a:t>Inspired by C++, syntax similar to JS. Supports types.</a:t>
+            </a:r>
+          </a:p>
+          <a:p>
+            <a:r>
+              <a:rPr lang="en-US" dirty="0"/>
+              <a:t>In the blockchain world, solidity is used for development to create smart contracts.</a:t>
+            </a:r>
+          </a:p>
+          <a:p>
+            <a:r>
+              <a:rPr lang="en-US" dirty="0"/>
+              <a:t>Complied with a byte code.</a:t>
+            </a:r>
+          </a:p>
+        </p:txBody>
+      </p:sp>
+    </p:spTree>
+    <p:extLst>
+      <p:ext uri="{BB962C8B-B14F-4D97-AF65-F5344CB8AC3E}">
+        <p14:creationId xmlns:p14="http://schemas.microsoft.com/office/powerpoint/2010/main" val="3250076975"/>
+      </p:ext>
+    </p:extLst>
+  </p:cSld>
+  <p:clrMapOvr>
+    <a:masterClrMapping/>
+  </p:clrMapOvr>
+</p:sld>
+</file>
+
+<file path=ppt/slides/slide8.xml><?xml version="1.0" encoding="utf-8"?>
+<p:sld xmlns:a="http://schemas.openxmlformats.org/drawingml/2006/main" xmlns:r="http://schemas.openxmlformats.org/officeDocument/2006/relationships" xmlns:p="http://schemas.openxmlformats.org/presentationml/2006/main">
+  <p:cSld>
+    <p:spTree>
+      <p:nvGrpSpPr>
+        <p:cNvPr id="1" name=""/>
+        <p:cNvGrpSpPr/>
+        <p:nvPr/>
+      </p:nvGrpSpPr>
+      <p:grpSpPr>
+        <a:xfrm>
+          <a:off x="0" y="0"/>
+          <a:ext cx="0" cy="0"/>
+          <a:chOff x="0" y="0"/>
+          <a:chExt cx="0" cy="0"/>
+        </a:xfrm>
+      </p:grpSpPr>
+      <p:sp>
+        <p:nvSpPr>
+          <p:cNvPr id="2" name="Title 1">
+            <a:extLst>
+              <a:ext uri="{FF2B5EF4-FFF2-40B4-BE49-F238E27FC236}">
+                <a16:creationId xmlns:a16="http://schemas.microsoft.com/office/drawing/2014/main" id="{2296697F-C659-AABC-8E77-ACC4EF4868BD}"/>
+              </a:ext>
+            </a:extLst>
+          </p:cNvPr>
+          <p:cNvSpPr>
+            <a:spLocks noGrp="1"/>
+          </p:cNvSpPr>
+          <p:nvPr>
+            <p:ph type="title"/>
+          </p:nvPr>
+        </p:nvSpPr>
+        <p:spPr/>
+        <p:txBody>
+          <a:bodyPr/>
+          <a:lstStyle/>
+          <a:p>
+            <a:r>
+              <a:rPr lang="en-US" dirty="0"/>
+              <a:t>Wallet</a:t>
+            </a:r>
+          </a:p>
+        </p:txBody>
+      </p:sp>
+      <p:sp>
+        <p:nvSpPr>
+          <p:cNvPr id="3" name="Content Placeholder 2">
+            <a:extLst>
+              <a:ext uri="{FF2B5EF4-FFF2-40B4-BE49-F238E27FC236}">
+                <a16:creationId xmlns:a16="http://schemas.microsoft.com/office/drawing/2014/main" id="{5879D6B3-CCB8-6B38-A778-29450C6488C7}"/>
+              </a:ext>
+            </a:extLst>
+          </p:cNvPr>
+          <p:cNvSpPr>
+            <a:spLocks noGrp="1"/>
+          </p:cNvSpPr>
+          <p:nvPr>
+            <p:ph idx="1"/>
+          </p:nvPr>
+        </p:nvSpPr>
+        <p:spPr/>
+        <p:txBody>
+          <a:bodyPr/>
+          <a:lstStyle/>
+          <a:p>
+            <a:r>
+              <a:rPr lang="en-US" dirty="0"/>
+              <a:t>Wallet is software or application.</a:t>
+            </a:r>
+          </a:p>
+          <a:p>
+            <a:r>
+              <a:rPr lang="en-US" dirty="0"/>
+              <a:t>Help to monitor your account. Kind of gateway to the Ethereum network.</a:t>
+            </a:r>
+          </a:p>
+          <a:p>
+            <a:r>
+              <a:rPr lang="en-US" dirty="0"/>
+              <a:t>Help to connect to your account. Create and send transactions.</a:t>
+            </a:r>
+          </a:p>
+          <a:p>
+            <a:endParaRPr lang="en-US" dirty="0"/>
+          </a:p>
+        </p:txBody>
+      </p:sp>
+    </p:spTree>
+    <p:extLst>
+      <p:ext uri="{BB962C8B-B14F-4D97-AF65-F5344CB8AC3E}">
+        <p14:creationId xmlns:p14="http://schemas.microsoft.com/office/powerpoint/2010/main" val="2747109370"/>
+      </p:ext>
+    </p:extLst>
+  </p:cSld>
+  <p:clrMapOvr>
+    <a:masterClrMapping/>
+  </p:clrMapOvr>
+</p:sld>
+</file>
+
+<file path=ppt/slides/slide9.xml><?xml version="1.0" encoding="utf-8"?>
+<p:sld xmlns:a="http://schemas.openxmlformats.org/drawingml/2006/main" xmlns:r="http://schemas.openxmlformats.org/officeDocument/2006/relationships" xmlns:p="http://schemas.openxmlformats.org/presentationml/2006/main">
+  <p:cSld>
+    <p:spTree>
+      <p:nvGrpSpPr>
+        <p:cNvPr id="1" name=""/>
+        <p:cNvGrpSpPr/>
+        <p:nvPr/>
+      </p:nvGrpSpPr>
+      <p:grpSpPr>
+        <a:xfrm>
+          <a:off x="0" y="0"/>
+          <a:ext cx="0" cy="0"/>
+          <a:chOff x="0" y="0"/>
+          <a:chExt cx="0" cy="0"/>
+        </a:xfrm>
+      </p:grpSpPr>
+      <p:sp>
+        <p:nvSpPr>
+          <p:cNvPr id="2" name="Title 1">
+            <a:extLst>
+              <a:ext uri="{FF2B5EF4-FFF2-40B4-BE49-F238E27FC236}">
+                <a16:creationId xmlns:a16="http://schemas.microsoft.com/office/drawing/2014/main" id="{8665B994-1B11-4DF8-4C7F-090145637A99}"/>
+              </a:ext>
+            </a:extLst>
+          </p:cNvPr>
+          <p:cNvSpPr>
+            <a:spLocks noGrp="1"/>
+          </p:cNvSpPr>
+          <p:nvPr>
+            <p:ph type="title"/>
+          </p:nvPr>
+        </p:nvSpPr>
+        <p:spPr/>
+        <p:txBody>
+          <a:bodyPr/>
+          <a:lstStyle/>
+          <a:p>
+            <a:r>
+              <a:rPr lang="en-US" dirty="0"/>
+              <a:t>Ethereum Remix</a:t>
+            </a:r>
+          </a:p>
+        </p:txBody>
+      </p:sp>
+      <p:sp>
+        <p:nvSpPr>
+          <p:cNvPr id="3" name="Content Placeholder 2">
+            <a:extLst>
+              <a:ext uri="{FF2B5EF4-FFF2-40B4-BE49-F238E27FC236}">
+                <a16:creationId xmlns:a16="http://schemas.microsoft.com/office/drawing/2014/main" id="{851579EB-39CD-F137-1151-057EFEE74E5A}"/>
+              </a:ext>
+            </a:extLst>
+          </p:cNvPr>
+          <p:cNvSpPr>
+            <a:spLocks noGrp="1"/>
+          </p:cNvSpPr>
+          <p:nvPr>
+            <p:ph idx="1"/>
+          </p:nvPr>
+        </p:nvSpPr>
+        <p:spPr/>
+        <p:txBody>
+          <a:bodyPr/>
+          <a:lstStyle/>
+          <a:p>
+            <a:r>
+              <a:rPr lang="en-US" dirty="0"/>
+              <a:t>Remix is an online IDE.</a:t>
+            </a:r>
+          </a:p>
+        </p:txBody>
+      </p:sp>
+    </p:spTree>
+    <p:extLst>
+      <p:ext uri="{BB962C8B-B14F-4D97-AF65-F5344CB8AC3E}">
+        <p14:creationId xmlns:p14="http://schemas.microsoft.com/office/powerpoint/2010/main" val="2213598643"/>
       </p:ext>
     </p:extLst>
   </p:cSld>

</xml_diff>